<commit_message>
ADD folgeseiten in Abschlusspräsentation zur auswahl
</commit_message>
<xml_diff>
--- a/Presentation/abschlusspraesentation.pptx
+++ b/Presentation/abschlusspraesentation.pptx
@@ -7,6 +7,10 @@
   <p:sldIdLst>
     <p:sldId id="256" r:id="rId2"/>
     <p:sldId id="257" r:id="rId3"/>
+    <p:sldId id="258" r:id="rId4"/>
+    <p:sldId id="259" r:id="rId5"/>
+    <p:sldId id="260" r:id="rId6"/>
+    <p:sldId id="261" r:id="rId7"/>
   </p:sldIdLst>
   <p:sldSz cx="9144000" cy="6858000" type="screen4x3"/>
   <p:notesSz cx="6858000" cy="9144000"/>
@@ -297,7 +301,7 @@
           <a:p>
             <a:fld id="{35338F35-DB24-49B2-A8E9-97B12F03D8AE}" type="datetimeFigureOut">
               <a:rPr lang="de-DE" smtClean="0"/>
-              <a:t>06.06.2013</a:t>
+              <a:t>12.06.2013</a:t>
             </a:fld>
             <a:endParaRPr lang="de-DE"/>
           </a:p>
@@ -474,7 +478,7 @@
           <a:p>
             <a:fld id="{35338F35-DB24-49B2-A8E9-97B12F03D8AE}" type="datetimeFigureOut">
               <a:rPr lang="de-DE" smtClean="0"/>
-              <a:t>06.06.2013</a:t>
+              <a:t>12.06.2013</a:t>
             </a:fld>
             <a:endParaRPr lang="de-DE"/>
           </a:p>
@@ -672,7 +676,7 @@
           <a:p>
             <a:fld id="{35338F35-DB24-49B2-A8E9-97B12F03D8AE}" type="datetimeFigureOut">
               <a:rPr lang="de-DE" smtClean="0"/>
-              <a:t>06.06.2013</a:t>
+              <a:t>12.06.2013</a:t>
             </a:fld>
             <a:endParaRPr lang="de-DE"/>
           </a:p>
@@ -826,7 +830,7 @@
           <a:p>
             <a:fld id="{35338F35-DB24-49B2-A8E9-97B12F03D8AE}" type="datetimeFigureOut">
               <a:rPr lang="de-DE" smtClean="0"/>
-              <a:t>06.06.2013</a:t>
+              <a:t>12.06.2013</a:t>
             </a:fld>
             <a:endParaRPr lang="de-DE"/>
           </a:p>
@@ -1101,7 +1105,7 @@
           <a:p>
             <a:fld id="{35338F35-DB24-49B2-A8E9-97B12F03D8AE}" type="datetimeFigureOut">
               <a:rPr lang="de-DE" smtClean="0"/>
-              <a:t>06.06.2013</a:t>
+              <a:t>12.06.2013</a:t>
             </a:fld>
             <a:endParaRPr lang="de-DE"/>
           </a:p>
@@ -1400,7 +1404,7 @@
           <a:p>
             <a:fld id="{35338F35-DB24-49B2-A8E9-97B12F03D8AE}" type="datetimeFigureOut">
               <a:rPr lang="de-DE" smtClean="0"/>
-              <a:t>06.06.2013</a:t>
+              <a:t>12.06.2013</a:t>
             </a:fld>
             <a:endParaRPr lang="de-DE"/>
           </a:p>
@@ -1842,7 +1846,7 @@
           <a:p>
             <a:fld id="{35338F35-DB24-49B2-A8E9-97B12F03D8AE}" type="datetimeFigureOut">
               <a:rPr lang="de-DE" smtClean="0"/>
-              <a:t>06.06.2013</a:t>
+              <a:t>12.06.2013</a:t>
             </a:fld>
             <a:endParaRPr lang="de-DE"/>
           </a:p>
@@ -1949,7 +1953,7 @@
           <a:p>
             <a:fld id="{35338F35-DB24-49B2-A8E9-97B12F03D8AE}" type="datetimeFigureOut">
               <a:rPr lang="de-DE" smtClean="0"/>
-              <a:t>06.06.2013</a:t>
+              <a:t>12.06.2013</a:t>
             </a:fld>
             <a:endParaRPr lang="de-DE"/>
           </a:p>
@@ -2069,7 +2073,7 @@
           <a:p>
             <a:fld id="{35338F35-DB24-49B2-A8E9-97B12F03D8AE}" type="datetimeFigureOut">
               <a:rPr lang="de-DE" smtClean="0"/>
-              <a:t>06.06.2013</a:t>
+              <a:t>12.06.2013</a:t>
             </a:fld>
             <a:endParaRPr lang="de-DE"/>
           </a:p>
@@ -2354,7 +2358,7 @@
           <a:p>
             <a:fld id="{35338F35-DB24-49B2-A8E9-97B12F03D8AE}" type="datetimeFigureOut">
               <a:rPr lang="de-DE" smtClean="0"/>
-              <a:t>06.06.2013</a:t>
+              <a:t>12.06.2013</a:t>
             </a:fld>
             <a:endParaRPr lang="de-DE"/>
           </a:p>
@@ -2625,7 +2629,7 @@
           <a:p>
             <a:fld id="{35338F35-DB24-49B2-A8E9-97B12F03D8AE}" type="datetimeFigureOut">
               <a:rPr lang="de-DE" smtClean="0"/>
-              <a:t>06.06.2013</a:t>
+              <a:t>12.06.2013</a:t>
             </a:fld>
             <a:endParaRPr lang="de-DE"/>
           </a:p>
@@ -2845,7 +2849,7 @@
           <a:p>
             <a:fld id="{35338F35-DB24-49B2-A8E9-97B12F03D8AE}" type="datetimeFigureOut">
               <a:rPr lang="de-DE" smtClean="0"/>
-              <a:t>06.06.2013</a:t>
+              <a:t>12.06.2013</a:t>
             </a:fld>
             <a:endParaRPr lang="de-DE"/>
           </a:p>
@@ -3407,11 +3411,15 @@
   <p:cSld>
     <p:bg>
       <p:bgPr>
-        <a:solidFill>
-          <a:srgbClr val="66DAD7">
-            <a:alpha val="95000"/>
-          </a:srgbClr>
-        </a:solidFill>
+        <a:blipFill dpi="0" rotWithShape="1">
+          <a:blip r:embed="rId2">
+            <a:lum/>
+          </a:blip>
+          <a:srcRect/>
+          <a:stretch>
+            <a:fillRect/>
+          </a:stretch>
+        </a:blipFill>
         <a:effectLst/>
       </p:bgPr>
     </p:bg>
@@ -3429,10 +3437,643 @@
           <a:chExt cx="0" cy="0"/>
         </a:xfrm>
       </p:grpSpPr>
+      <p:sp>
+        <p:nvSpPr>
+          <p:cNvPr id="4" name="Textplatzhalter 2"/>
+          <p:cNvSpPr>
+            <a:spLocks noGrp="1"/>
+          </p:cNvSpPr>
+          <p:nvPr>
+            <p:ph type="body" idx="1"/>
+          </p:nvPr>
+        </p:nvSpPr>
+        <p:spPr>
+          <a:xfrm>
+            <a:off x="578903" y="1700808"/>
+            <a:ext cx="7920880" cy="4248472"/>
+          </a:xfrm>
+        </p:spPr>
+        <p:txBody>
+          <a:bodyPr/>
+          <a:lstStyle/>
+          <a:p>
+            <a:r>
+              <a:rPr lang="de-DE" dirty="0">
+                <a:solidFill>
+                  <a:schemeClr val="bg1"/>
+                </a:solidFill>
+              </a:rPr>
+              <a:t>Ich bin ein Beispieltext mit einem Beispielbild</a:t>
+            </a:r>
+          </a:p>
+        </p:txBody>
+      </p:sp>
+      <p:sp>
+        <p:nvSpPr>
+          <p:cNvPr id="5" name="Titel 1"/>
+          <p:cNvSpPr>
+            <a:spLocks noGrp="1"/>
+          </p:cNvSpPr>
+          <p:nvPr>
+            <p:ph type="title"/>
+          </p:nvPr>
+        </p:nvSpPr>
+        <p:spPr>
+          <a:xfrm>
+            <a:off x="539552" y="260648"/>
+            <a:ext cx="6172200" cy="1008112"/>
+          </a:xfrm>
+        </p:spPr>
+        <p:txBody>
+          <a:bodyPr/>
+          <a:lstStyle/>
+          <a:p>
+            <a:r>
+              <a:rPr lang="de-DE" dirty="0"/>
+              <a:t>Muster</a:t>
+            </a:r>
+          </a:p>
+        </p:txBody>
+      </p:sp>
     </p:spTree>
     <p:extLst>
       <p:ext uri="{BB962C8B-B14F-4D97-AF65-F5344CB8AC3E}">
-        <p14:creationId xmlns:p14="http://schemas.microsoft.com/office/powerpoint/2010/main" val="1696846407"/>
+        <p14:creationId xmlns:p14="http://schemas.microsoft.com/office/powerpoint/2010/main" val="2384525814"/>
+      </p:ext>
+    </p:extLst>
+  </p:cSld>
+  <p:clrMapOvr>
+    <a:masterClrMapping/>
+  </p:clrMapOvr>
+  <p:timing>
+    <p:tnLst>
+      <p:par>
+        <p:cTn id="1" dur="indefinite" restart="never" nodeType="tmRoot"/>
+      </p:par>
+    </p:tnLst>
+  </p:timing>
+</p:sld>
+</file>
+
+<file path=ppt/slides/slide3.xml><?xml version="1.0" encoding="utf-8"?>
+<p:sld xmlns:a="http://schemas.openxmlformats.org/drawingml/2006/main" xmlns:r="http://schemas.openxmlformats.org/officeDocument/2006/relationships" xmlns:p="http://schemas.openxmlformats.org/presentationml/2006/main">
+  <p:cSld>
+    <p:bg>
+      <p:bgPr>
+        <a:blipFill dpi="0" rotWithShape="1">
+          <a:blip r:embed="rId2">
+            <a:lum/>
+          </a:blip>
+          <a:srcRect/>
+          <a:stretch>
+            <a:fillRect/>
+          </a:stretch>
+        </a:blipFill>
+        <a:effectLst/>
+      </p:bgPr>
+    </p:bg>
+    <p:spTree>
+      <p:nvGrpSpPr>
+        <p:cNvPr id="1" name=""/>
+        <p:cNvGrpSpPr/>
+        <p:nvPr/>
+      </p:nvGrpSpPr>
+      <p:grpSpPr>
+        <a:xfrm>
+          <a:off x="0" y="0"/>
+          <a:ext cx="0" cy="0"/>
+          <a:chOff x="0" y="0"/>
+          <a:chExt cx="0" cy="0"/>
+        </a:xfrm>
+      </p:grpSpPr>
+      <p:sp>
+        <p:nvSpPr>
+          <p:cNvPr id="4" name="Textplatzhalter 2"/>
+          <p:cNvSpPr>
+            <a:spLocks noGrp="1"/>
+          </p:cNvSpPr>
+          <p:nvPr>
+            <p:ph type="body" idx="1"/>
+          </p:nvPr>
+        </p:nvSpPr>
+        <p:spPr>
+          <a:xfrm>
+            <a:off x="578903" y="1700808"/>
+            <a:ext cx="7920880" cy="4248472"/>
+          </a:xfrm>
+        </p:spPr>
+        <p:txBody>
+          <a:bodyPr/>
+          <a:lstStyle/>
+          <a:p>
+            <a:r>
+              <a:rPr lang="de-DE" dirty="0" smtClean="0">
+                <a:solidFill>
+                  <a:schemeClr val="bg1"/>
+                </a:solidFill>
+              </a:rPr>
+              <a:t>Ich bin ein Beispieltext mit einem Beispielbild</a:t>
+            </a:r>
+            <a:endParaRPr lang="de-DE" dirty="0">
+              <a:solidFill>
+                <a:schemeClr val="bg1"/>
+              </a:solidFill>
+            </a:endParaRPr>
+          </a:p>
+        </p:txBody>
+      </p:sp>
+      <p:sp>
+        <p:nvSpPr>
+          <p:cNvPr id="5" name="Titel 1"/>
+          <p:cNvSpPr>
+            <a:spLocks noGrp="1"/>
+          </p:cNvSpPr>
+          <p:nvPr>
+            <p:ph type="title"/>
+          </p:nvPr>
+        </p:nvSpPr>
+        <p:spPr>
+          <a:xfrm>
+            <a:off x="539552" y="260648"/>
+            <a:ext cx="6172200" cy="1008112"/>
+          </a:xfrm>
+        </p:spPr>
+        <p:txBody>
+          <a:bodyPr/>
+          <a:lstStyle/>
+          <a:p>
+            <a:r>
+              <a:rPr lang="de-DE" dirty="0" smtClean="0">
+                <a:latin typeface="Calibri" pitchFamily="34" charset="0"/>
+              </a:rPr>
+              <a:t>Muster</a:t>
+            </a:r>
+            <a:endParaRPr lang="de-DE" dirty="0">
+              <a:latin typeface="Calibri" pitchFamily="34" charset="0"/>
+            </a:endParaRPr>
+          </a:p>
+        </p:txBody>
+      </p:sp>
+    </p:spTree>
+    <p:extLst>
+      <p:ext uri="{BB962C8B-B14F-4D97-AF65-F5344CB8AC3E}">
+        <p14:creationId xmlns:p14="http://schemas.microsoft.com/office/powerpoint/2010/main" val="736413357"/>
+      </p:ext>
+    </p:extLst>
+  </p:cSld>
+  <p:clrMapOvr>
+    <a:masterClrMapping/>
+  </p:clrMapOvr>
+  <p:timing>
+    <p:tnLst>
+      <p:par>
+        <p:cTn id="1" dur="indefinite" restart="never" nodeType="tmRoot"/>
+      </p:par>
+    </p:tnLst>
+  </p:timing>
+</p:sld>
+</file>
+
+<file path=ppt/slides/slide4.xml><?xml version="1.0" encoding="utf-8"?>
+<p:sld xmlns:a="http://schemas.openxmlformats.org/drawingml/2006/main" xmlns:r="http://schemas.openxmlformats.org/officeDocument/2006/relationships" xmlns:p="http://schemas.openxmlformats.org/presentationml/2006/main">
+  <p:cSld>
+    <p:bg>
+      <p:bgPr>
+        <a:blipFill dpi="0" rotWithShape="1">
+          <a:blip r:embed="rId2">
+            <a:lum/>
+          </a:blip>
+          <a:srcRect/>
+          <a:stretch>
+            <a:fillRect/>
+          </a:stretch>
+        </a:blipFill>
+        <a:effectLst/>
+      </p:bgPr>
+    </p:bg>
+    <p:spTree>
+      <p:nvGrpSpPr>
+        <p:cNvPr id="1" name=""/>
+        <p:cNvGrpSpPr/>
+        <p:nvPr/>
+      </p:nvGrpSpPr>
+      <p:grpSpPr>
+        <a:xfrm>
+          <a:off x="0" y="0"/>
+          <a:ext cx="0" cy="0"/>
+          <a:chOff x="0" y="0"/>
+          <a:chExt cx="0" cy="0"/>
+        </a:xfrm>
+      </p:grpSpPr>
+      <p:sp>
+        <p:nvSpPr>
+          <p:cNvPr id="2" name="Titel 1"/>
+          <p:cNvSpPr>
+            <a:spLocks noGrp="1"/>
+          </p:cNvSpPr>
+          <p:nvPr>
+            <p:ph type="title"/>
+          </p:nvPr>
+        </p:nvSpPr>
+        <p:spPr>
+          <a:xfrm>
+            <a:off x="539552" y="260648"/>
+            <a:ext cx="6172200" cy="1008112"/>
+          </a:xfrm>
+        </p:spPr>
+        <p:txBody>
+          <a:bodyPr/>
+          <a:lstStyle/>
+          <a:p>
+            <a:r>
+              <a:rPr lang="de-DE" dirty="0" smtClean="0">
+                <a:solidFill>
+                  <a:srgbClr val="6ECDD2"/>
+                </a:solidFill>
+                <a:latin typeface="Calibri" pitchFamily="34" charset="0"/>
+              </a:rPr>
+              <a:t>Muster</a:t>
+            </a:r>
+            <a:endParaRPr lang="de-DE" dirty="0">
+              <a:solidFill>
+                <a:srgbClr val="6ECDD2"/>
+              </a:solidFill>
+              <a:latin typeface="Calibri" pitchFamily="34" charset="0"/>
+            </a:endParaRPr>
+          </a:p>
+        </p:txBody>
+      </p:sp>
+      <p:sp>
+        <p:nvSpPr>
+          <p:cNvPr id="3" name="Textplatzhalter 2"/>
+          <p:cNvSpPr>
+            <a:spLocks noGrp="1"/>
+          </p:cNvSpPr>
+          <p:nvPr>
+            <p:ph type="body" idx="1"/>
+          </p:nvPr>
+        </p:nvSpPr>
+        <p:spPr>
+          <a:xfrm>
+            <a:off x="611560" y="1916832"/>
+            <a:ext cx="7920880" cy="4608512"/>
+          </a:xfrm>
+        </p:spPr>
+        <p:txBody>
+          <a:bodyPr/>
+          <a:lstStyle/>
+          <a:p>
+            <a:r>
+              <a:rPr lang="de-DE" dirty="0" smtClean="0">
+                <a:solidFill>
+                  <a:schemeClr val="bg1"/>
+                </a:solidFill>
+              </a:rPr>
+              <a:t>Ich bin ein Beispieltext mit einem Beispielbild</a:t>
+            </a:r>
+            <a:endParaRPr lang="de-DE" dirty="0">
+              <a:solidFill>
+                <a:schemeClr val="bg1"/>
+              </a:solidFill>
+            </a:endParaRPr>
+          </a:p>
+        </p:txBody>
+      </p:sp>
+    </p:spTree>
+    <p:extLst>
+      <p:ext uri="{BB962C8B-B14F-4D97-AF65-F5344CB8AC3E}">
+        <p14:creationId xmlns:p14="http://schemas.microsoft.com/office/powerpoint/2010/main" val="3443593050"/>
+      </p:ext>
+    </p:extLst>
+  </p:cSld>
+  <p:clrMapOvr>
+    <a:masterClrMapping/>
+  </p:clrMapOvr>
+  <p:timing>
+    <p:tnLst>
+      <p:par>
+        <p:cTn id="1" dur="indefinite" restart="never" nodeType="tmRoot"/>
+      </p:par>
+    </p:tnLst>
+  </p:timing>
+</p:sld>
+</file>
+
+<file path=ppt/slides/slide5.xml><?xml version="1.0" encoding="utf-8"?>
+<p:sld xmlns:a="http://schemas.openxmlformats.org/drawingml/2006/main" xmlns:r="http://schemas.openxmlformats.org/officeDocument/2006/relationships" xmlns:p="http://schemas.openxmlformats.org/presentationml/2006/main">
+  <p:cSld>
+    <p:bg>
+      <p:bgPr>
+        <a:blipFill dpi="0" rotWithShape="1">
+          <a:blip r:embed="rId2">
+            <a:lum/>
+          </a:blip>
+          <a:srcRect/>
+          <a:stretch>
+            <a:fillRect/>
+          </a:stretch>
+        </a:blipFill>
+        <a:effectLst/>
+      </p:bgPr>
+    </p:bg>
+    <p:spTree>
+      <p:nvGrpSpPr>
+        <p:cNvPr id="1" name=""/>
+        <p:cNvGrpSpPr/>
+        <p:nvPr/>
+      </p:nvGrpSpPr>
+      <p:grpSpPr>
+        <a:xfrm>
+          <a:off x="0" y="0"/>
+          <a:ext cx="0" cy="0"/>
+          <a:chOff x="0" y="0"/>
+          <a:chExt cx="0" cy="0"/>
+        </a:xfrm>
+      </p:grpSpPr>
+      <p:sp>
+        <p:nvSpPr>
+          <p:cNvPr id="2" name="Titel 1"/>
+          <p:cNvSpPr>
+            <a:spLocks noGrp="1"/>
+          </p:cNvSpPr>
+          <p:nvPr>
+            <p:ph type="title"/>
+          </p:nvPr>
+        </p:nvSpPr>
+        <p:spPr>
+          <a:xfrm>
+            <a:off x="1475656" y="188640"/>
+            <a:ext cx="6172200" cy="1008112"/>
+          </a:xfrm>
+        </p:spPr>
+        <p:txBody>
+          <a:bodyPr/>
+          <a:lstStyle/>
+          <a:p>
+            <a:r>
+              <a:rPr lang="de-DE" dirty="0" smtClean="0">
+                <a:solidFill>
+                  <a:srgbClr val="6ECDD2"/>
+                </a:solidFill>
+              </a:rPr>
+              <a:t>Muster</a:t>
+            </a:r>
+            <a:endParaRPr lang="de-DE" dirty="0">
+              <a:solidFill>
+                <a:srgbClr val="6ECDD2"/>
+              </a:solidFill>
+            </a:endParaRPr>
+          </a:p>
+        </p:txBody>
+      </p:sp>
+      <p:sp>
+        <p:nvSpPr>
+          <p:cNvPr id="3" name="Textplatzhalter 2"/>
+          <p:cNvSpPr>
+            <a:spLocks noGrp="1"/>
+          </p:cNvSpPr>
+          <p:nvPr>
+            <p:ph type="body" idx="1"/>
+          </p:nvPr>
+        </p:nvSpPr>
+        <p:spPr>
+          <a:xfrm>
+            <a:off x="1619672" y="1196752"/>
+            <a:ext cx="6912768" cy="5400600"/>
+          </a:xfrm>
+        </p:spPr>
+        <p:txBody>
+          <a:bodyPr/>
+          <a:lstStyle/>
+          <a:p>
+            <a:r>
+              <a:rPr lang="de-DE" dirty="0" smtClean="0">
+                <a:solidFill>
+                  <a:schemeClr val="bg1"/>
+                </a:solidFill>
+              </a:rPr>
+              <a:t>Ich bin ein Beispieltext mit einem Beispielbild auf der Folie.</a:t>
+            </a:r>
+            <a:endParaRPr lang="de-DE" dirty="0">
+              <a:solidFill>
+                <a:schemeClr val="bg1"/>
+              </a:solidFill>
+            </a:endParaRPr>
+          </a:p>
+        </p:txBody>
+      </p:sp>
+    </p:spTree>
+    <p:extLst>
+      <p:ext uri="{BB962C8B-B14F-4D97-AF65-F5344CB8AC3E}">
+        <p14:creationId xmlns:p14="http://schemas.microsoft.com/office/powerpoint/2010/main" val="1319889826"/>
+      </p:ext>
+    </p:extLst>
+  </p:cSld>
+  <p:clrMapOvr>
+    <a:masterClrMapping/>
+  </p:clrMapOvr>
+  <p:timing>
+    <p:tnLst>
+      <p:par>
+        <p:cTn id="1" dur="indefinite" restart="never" nodeType="tmRoot"/>
+      </p:par>
+    </p:tnLst>
+  </p:timing>
+</p:sld>
+</file>
+
+<file path=ppt/slides/slide6.xml><?xml version="1.0" encoding="utf-8"?>
+<p:sld xmlns:a="http://schemas.openxmlformats.org/drawingml/2006/main" xmlns:r="http://schemas.openxmlformats.org/officeDocument/2006/relationships" xmlns:p="http://schemas.openxmlformats.org/presentationml/2006/main">
+  <p:cSld>
+    <p:bg>
+      <p:bgPr>
+        <a:blipFill dpi="0" rotWithShape="1">
+          <a:blip r:embed="rId2">
+            <a:lum/>
+          </a:blip>
+          <a:srcRect/>
+          <a:stretch>
+            <a:fillRect/>
+          </a:stretch>
+        </a:blipFill>
+        <a:effectLst/>
+      </p:bgPr>
+    </p:bg>
+    <p:spTree>
+      <p:nvGrpSpPr>
+        <p:cNvPr id="1" name=""/>
+        <p:cNvGrpSpPr/>
+        <p:nvPr/>
+      </p:nvGrpSpPr>
+      <p:grpSpPr>
+        <a:xfrm>
+          <a:off x="0" y="0"/>
+          <a:ext cx="0" cy="0"/>
+          <a:chOff x="0" y="0"/>
+          <a:chExt cx="0" cy="0"/>
+        </a:xfrm>
+      </p:grpSpPr>
+      <p:sp>
+        <p:nvSpPr>
+          <p:cNvPr id="2" name="Titel 1"/>
+          <p:cNvSpPr>
+            <a:spLocks noGrp="1"/>
+          </p:cNvSpPr>
+          <p:nvPr>
+            <p:ph type="title"/>
+          </p:nvPr>
+        </p:nvSpPr>
+        <p:spPr>
+          <a:xfrm>
+            <a:off x="1860104" y="1268760"/>
+            <a:ext cx="6172200" cy="5184576"/>
+          </a:xfrm>
+        </p:spPr>
+        <p:txBody>
+          <a:bodyPr/>
+          <a:lstStyle/>
+          <a:p>
+            <a:r>
+              <a:rPr lang="de-DE" sz="2800" b="0" dirty="0" smtClean="0">
+                <a:solidFill>
+                  <a:schemeClr val="bg1"/>
+                </a:solidFill>
+                <a:latin typeface="Calibri" pitchFamily="34" charset="0"/>
+              </a:rPr>
+              <a:t>Hallo ich bin </a:t>
+            </a:r>
+            <a:r>
+              <a:rPr lang="de-DE" sz="2800" b="0" dirty="0" err="1" smtClean="0">
+                <a:solidFill>
+                  <a:schemeClr val="bg1"/>
+                </a:solidFill>
+                <a:latin typeface="Calibri" pitchFamily="34" charset="0"/>
+              </a:rPr>
+              <a:t>platzhalter</a:t>
+            </a:r>
+            <a:endParaRPr lang="de-DE" sz="2800" b="0" dirty="0">
+              <a:solidFill>
+                <a:schemeClr val="bg1"/>
+              </a:solidFill>
+              <a:latin typeface="Calibri" pitchFamily="34" charset="0"/>
+            </a:endParaRPr>
+          </a:p>
+        </p:txBody>
+      </p:sp>
+      <p:sp>
+        <p:nvSpPr>
+          <p:cNvPr id="4" name="Titel 1"/>
+          <p:cNvSpPr txBox="1">
+            <a:spLocks/>
+          </p:cNvSpPr>
+          <p:nvPr/>
+        </p:nvSpPr>
+        <p:spPr>
+          <a:xfrm>
+            <a:off x="1835696" y="188640"/>
+            <a:ext cx="6172200" cy="1008112"/>
+          </a:xfrm>
+          <a:prstGeom prst="rect">
+            <a:avLst/>
+          </a:prstGeom>
+        </p:spPr>
+        <p:txBody>
+          <a:bodyPr vert="horz" lIns="91440" tIns="45720" rIns="91440" bIns="45720" rtlCol="0" anchor="t">
+            <a:noAutofit/>
+          </a:bodyPr>
+          <a:lstStyle>
+            <a:lvl1pPr algn="l" defTabSz="914400" rtl="0" eaLnBrk="1" latinLnBrk="0" hangingPunct="1">
+              <a:spcBef>
+                <a:spcPct val="0"/>
+              </a:spcBef>
+              <a:buNone/>
+              <a:defRPr sz="4800" b="1" kern="1200" cap="all" baseline="0">
+                <a:solidFill>
+                  <a:schemeClr val="tx1"/>
+                </a:solidFill>
+                <a:latin typeface="+mj-lt"/>
+                <a:ea typeface="+mj-ea"/>
+                <a:cs typeface="+mj-cs"/>
+              </a:defRPr>
+            </a:lvl1pPr>
+            <a:lvl2pPr eaLnBrk="1" hangingPunct="1">
+              <a:defRPr>
+                <a:solidFill>
+                  <a:schemeClr val="tx2"/>
+                </a:solidFill>
+              </a:defRPr>
+            </a:lvl2pPr>
+            <a:lvl3pPr eaLnBrk="1" hangingPunct="1">
+              <a:defRPr>
+                <a:solidFill>
+                  <a:schemeClr val="tx2"/>
+                </a:solidFill>
+              </a:defRPr>
+            </a:lvl3pPr>
+            <a:lvl4pPr eaLnBrk="1" hangingPunct="1">
+              <a:defRPr>
+                <a:solidFill>
+                  <a:schemeClr val="tx2"/>
+                </a:solidFill>
+              </a:defRPr>
+            </a:lvl4pPr>
+            <a:lvl5pPr eaLnBrk="1" hangingPunct="1">
+              <a:defRPr>
+                <a:solidFill>
+                  <a:schemeClr val="tx2"/>
+                </a:solidFill>
+              </a:defRPr>
+            </a:lvl5pPr>
+            <a:lvl6pPr eaLnBrk="1" hangingPunct="1">
+              <a:defRPr>
+                <a:solidFill>
+                  <a:schemeClr val="tx2"/>
+                </a:solidFill>
+              </a:defRPr>
+            </a:lvl6pPr>
+            <a:lvl7pPr eaLnBrk="1" hangingPunct="1">
+              <a:defRPr>
+                <a:solidFill>
+                  <a:schemeClr val="tx2"/>
+                </a:solidFill>
+              </a:defRPr>
+            </a:lvl7pPr>
+            <a:lvl8pPr eaLnBrk="1" hangingPunct="1">
+              <a:defRPr>
+                <a:solidFill>
+                  <a:schemeClr val="tx2"/>
+                </a:solidFill>
+              </a:defRPr>
+            </a:lvl8pPr>
+            <a:lvl9pPr eaLnBrk="1" hangingPunct="1">
+              <a:defRPr>
+                <a:solidFill>
+                  <a:schemeClr val="tx2"/>
+                </a:solidFill>
+              </a:defRPr>
+            </a:lvl9pPr>
+          </a:lstStyle>
+          <a:p>
+            <a:r>
+              <a:rPr lang="de-DE" smtClean="0">
+                <a:solidFill>
+                  <a:srgbClr val="6ECDD2"/>
+                </a:solidFill>
+              </a:rPr>
+              <a:t>Muster</a:t>
+            </a:r>
+            <a:endParaRPr lang="de-DE" dirty="0">
+              <a:solidFill>
+                <a:srgbClr val="6ECDD2"/>
+              </a:solidFill>
+            </a:endParaRPr>
+          </a:p>
+        </p:txBody>
+      </p:sp>
+    </p:spTree>
+    <p:extLst>
+      <p:ext uri="{BB962C8B-B14F-4D97-AF65-F5344CB8AC3E}">
+        <p14:creationId xmlns:p14="http://schemas.microsoft.com/office/powerpoint/2010/main" val="2874446517"/>
       </p:ext>
     </p:extLst>
   </p:cSld>

</xml_diff>

<commit_message>
CHG: tests for spielbrett
</commit_message>
<xml_diff>
--- a/Presentation/abschlusspraesentation.pptx
+++ b/Presentation/abschlusspraesentation.pptx
@@ -301,7 +301,7 @@
           <a:p>
             <a:fld id="{35338F35-DB24-49B2-A8E9-97B12F03D8AE}" type="datetimeFigureOut">
               <a:rPr lang="de-DE" smtClean="0"/>
-              <a:t>12.06.2013</a:t>
+              <a:t>18.06.13</a:t>
             </a:fld>
             <a:endParaRPr lang="de-DE"/>
           </a:p>
@@ -357,7 +357,7 @@
   <p:timing>
     <p:tnLst>
       <p:par>
-        <p:cTn id="1" dur="indefinite" restart="never" nodeType="tmRoot"/>
+        <p:cTn xmlns:p14="http://schemas.microsoft.com/office/powerpoint/2010/main" id="1" dur="indefinite" restart="never" nodeType="tmRoot"/>
       </p:par>
     </p:tnLst>
   </p:timing>
@@ -478,7 +478,7 @@
           <a:p>
             <a:fld id="{35338F35-DB24-49B2-A8E9-97B12F03D8AE}" type="datetimeFigureOut">
               <a:rPr lang="de-DE" smtClean="0"/>
-              <a:t>12.06.2013</a:t>
+              <a:t>18.06.13</a:t>
             </a:fld>
             <a:endParaRPr lang="de-DE"/>
           </a:p>
@@ -534,7 +534,7 @@
   <p:timing>
     <p:tnLst>
       <p:par>
-        <p:cTn id="1" dur="indefinite" restart="never" nodeType="tmRoot"/>
+        <p:cTn xmlns:p14="http://schemas.microsoft.com/office/powerpoint/2010/main" id="1" dur="indefinite" restart="never" nodeType="tmRoot"/>
       </p:par>
     </p:tnLst>
   </p:timing>
@@ -676,7 +676,7 @@
           <a:p>
             <a:fld id="{35338F35-DB24-49B2-A8E9-97B12F03D8AE}" type="datetimeFigureOut">
               <a:rPr lang="de-DE" smtClean="0"/>
-              <a:t>12.06.2013</a:t>
+              <a:t>18.06.13</a:t>
             </a:fld>
             <a:endParaRPr lang="de-DE"/>
           </a:p>
@@ -732,7 +732,7 @@
   <p:timing>
     <p:tnLst>
       <p:par>
-        <p:cTn id="1" dur="indefinite" restart="never" nodeType="tmRoot"/>
+        <p:cTn xmlns:p14="http://schemas.microsoft.com/office/powerpoint/2010/main" id="1" dur="indefinite" restart="never" nodeType="tmRoot"/>
       </p:par>
     </p:tnLst>
   </p:timing>
@@ -830,7 +830,7 @@
           <a:p>
             <a:fld id="{35338F35-DB24-49B2-A8E9-97B12F03D8AE}" type="datetimeFigureOut">
               <a:rPr lang="de-DE" smtClean="0"/>
-              <a:t>12.06.2013</a:t>
+              <a:t>18.06.13</a:t>
             </a:fld>
             <a:endParaRPr lang="de-DE"/>
           </a:p>
@@ -909,7 +909,7 @@
   <p:timing>
     <p:tnLst>
       <p:par>
-        <p:cTn id="1" dur="indefinite" restart="never" nodeType="tmRoot"/>
+        <p:cTn xmlns:p14="http://schemas.microsoft.com/office/powerpoint/2010/main" id="1" dur="indefinite" restart="never" nodeType="tmRoot"/>
       </p:par>
     </p:tnLst>
   </p:timing>
@@ -1105,7 +1105,7 @@
           <a:p>
             <a:fld id="{35338F35-DB24-49B2-A8E9-97B12F03D8AE}" type="datetimeFigureOut">
               <a:rPr lang="de-DE" smtClean="0"/>
-              <a:t>12.06.2013</a:t>
+              <a:t>18.06.13</a:t>
             </a:fld>
             <a:endParaRPr lang="de-DE"/>
           </a:p>
@@ -1161,7 +1161,7 @@
   <p:timing>
     <p:tnLst>
       <p:par>
-        <p:cTn id="1" dur="indefinite" restart="never" nodeType="tmRoot"/>
+        <p:cTn xmlns:p14="http://schemas.microsoft.com/office/powerpoint/2010/main" id="1" dur="indefinite" restart="never" nodeType="tmRoot"/>
       </p:par>
     </p:tnLst>
   </p:timing>
@@ -1404,7 +1404,7 @@
           <a:p>
             <a:fld id="{35338F35-DB24-49B2-A8E9-97B12F03D8AE}" type="datetimeFigureOut">
               <a:rPr lang="de-DE" smtClean="0"/>
-              <a:t>12.06.2013</a:t>
+              <a:t>18.06.13</a:t>
             </a:fld>
             <a:endParaRPr lang="de-DE"/>
           </a:p>
@@ -1465,7 +1465,7 @@
   <p:timing>
     <p:tnLst>
       <p:par>
-        <p:cTn id="1" dur="indefinite" restart="never" nodeType="tmRoot"/>
+        <p:cTn xmlns:p14="http://schemas.microsoft.com/office/powerpoint/2010/main" id="1" dur="indefinite" restart="never" nodeType="tmRoot"/>
       </p:par>
     </p:tnLst>
   </p:timing>
@@ -1846,7 +1846,7 @@
           <a:p>
             <a:fld id="{35338F35-DB24-49B2-A8E9-97B12F03D8AE}" type="datetimeFigureOut">
               <a:rPr lang="de-DE" smtClean="0"/>
-              <a:t>12.06.2013</a:t>
+              <a:t>18.06.13</a:t>
             </a:fld>
             <a:endParaRPr lang="de-DE"/>
           </a:p>
@@ -1907,7 +1907,7 @@
   <p:timing>
     <p:tnLst>
       <p:par>
-        <p:cTn id="1" dur="indefinite" restart="never" nodeType="tmRoot"/>
+        <p:cTn xmlns:p14="http://schemas.microsoft.com/office/powerpoint/2010/main" id="1" dur="indefinite" restart="never" nodeType="tmRoot"/>
       </p:par>
     </p:tnLst>
   </p:timing>
@@ -1953,7 +1953,7 @@
           <a:p>
             <a:fld id="{35338F35-DB24-49B2-A8E9-97B12F03D8AE}" type="datetimeFigureOut">
               <a:rPr lang="de-DE" smtClean="0"/>
-              <a:t>12.06.2013</a:t>
+              <a:t>18.06.13</a:t>
             </a:fld>
             <a:endParaRPr lang="de-DE"/>
           </a:p>
@@ -2032,7 +2032,7 @@
   <p:timing>
     <p:tnLst>
       <p:par>
-        <p:cTn id="1" dur="indefinite" restart="never" nodeType="tmRoot"/>
+        <p:cTn xmlns:p14="http://schemas.microsoft.com/office/powerpoint/2010/main" id="1" dur="indefinite" restart="never" nodeType="tmRoot"/>
       </p:par>
     </p:tnLst>
   </p:timing>
@@ -2073,7 +2073,7 @@
           <a:p>
             <a:fld id="{35338F35-DB24-49B2-A8E9-97B12F03D8AE}" type="datetimeFigureOut">
               <a:rPr lang="de-DE" smtClean="0"/>
-              <a:t>12.06.2013</a:t>
+              <a:t>18.06.13</a:t>
             </a:fld>
             <a:endParaRPr lang="de-DE"/>
           </a:p>
@@ -2129,7 +2129,7 @@
   <p:timing>
     <p:tnLst>
       <p:par>
-        <p:cTn id="1" dur="indefinite" restart="never" nodeType="tmRoot"/>
+        <p:cTn xmlns:p14="http://schemas.microsoft.com/office/powerpoint/2010/main" id="1" dur="indefinite" restart="never" nodeType="tmRoot"/>
       </p:par>
     </p:tnLst>
   </p:timing>
@@ -2358,7 +2358,7 @@
           <a:p>
             <a:fld id="{35338F35-DB24-49B2-A8E9-97B12F03D8AE}" type="datetimeFigureOut">
               <a:rPr lang="de-DE" smtClean="0"/>
-              <a:t>12.06.2013</a:t>
+              <a:t>18.06.13</a:t>
             </a:fld>
             <a:endParaRPr lang="de-DE"/>
           </a:p>
@@ -2419,7 +2419,7 @@
   <p:timing>
     <p:tnLst>
       <p:par>
-        <p:cTn id="1" dur="indefinite" restart="never" nodeType="tmRoot"/>
+        <p:cTn xmlns:p14="http://schemas.microsoft.com/office/powerpoint/2010/main" id="1" dur="indefinite" restart="never" nodeType="tmRoot"/>
       </p:par>
     </p:tnLst>
   </p:timing>
@@ -2629,7 +2629,7 @@
           <a:p>
             <a:fld id="{35338F35-DB24-49B2-A8E9-97B12F03D8AE}" type="datetimeFigureOut">
               <a:rPr lang="de-DE" smtClean="0"/>
-              <a:t>12.06.2013</a:t>
+              <a:t>18.06.13</a:t>
             </a:fld>
             <a:endParaRPr lang="de-DE"/>
           </a:p>
@@ -2690,7 +2690,7 @@
   <p:timing>
     <p:tnLst>
       <p:par>
-        <p:cTn id="1" dur="indefinite" restart="never" nodeType="tmRoot"/>
+        <p:cTn xmlns:p14="http://schemas.microsoft.com/office/powerpoint/2010/main" id="1" dur="indefinite" restart="never" nodeType="tmRoot"/>
       </p:par>
     </p:tnLst>
   </p:timing>
@@ -2849,7 +2849,7 @@
           <a:p>
             <a:fld id="{35338F35-DB24-49B2-A8E9-97B12F03D8AE}" type="datetimeFigureOut">
               <a:rPr lang="de-DE" smtClean="0"/>
-              <a:t>12.06.2013</a:t>
+              <a:t>18.06.13</a:t>
             </a:fld>
             <a:endParaRPr lang="de-DE"/>
           </a:p>
@@ -2950,7 +2950,7 @@
   <p:timing>
     <p:tnLst>
       <p:par>
-        <p:cTn id="1" dur="indefinite" restart="never" nodeType="tmRoot"/>
+        <p:cTn xmlns:p14="http://schemas.microsoft.com/office/powerpoint/2010/main" id="1" dur="indefinite" restart="never" nodeType="tmRoot"/>
       </p:par>
     </p:tnLst>
   </p:timing>
@@ -3318,7 +3318,7 @@
           <a:p>
             <a:pPr algn="ctr"/>
             <a:r>
-              <a:rPr lang="de-DE" sz="3200" b="1" dirty="0" err="1" smtClean="0">
+              <a:rPr lang="de-DE" sz="3200" b="1" smtClean="0">
                 <a:solidFill>
                   <a:schemeClr val="bg1">
                     <a:lumMod val="50000"/>
@@ -3326,10 +3326,10 @@
                 </a:solidFill>
                 <a:latin typeface="Century Gothic" pitchFamily="34" charset="0"/>
               </a:rPr>
-              <a:t>Projektdokumentaion</a:t>
-            </a:r>
-            <a:r>
-              <a:rPr lang="de-DE" sz="3200" dirty="0" smtClean="0">
+              <a:t>Projektpräsentation</a:t>
+            </a:r>
+            <a:r>
+              <a:rPr lang="de-DE" sz="3200" smtClean="0">
                 <a:solidFill>
                   <a:schemeClr val="bg1">
                     <a:lumMod val="50000"/>
@@ -3339,6 +3339,14 @@
               </a:rPr>
               <a:t> </a:t>
             </a:r>
+            <a:endParaRPr lang="de-DE" sz="3200" dirty="0" smtClean="0">
+              <a:solidFill>
+                <a:schemeClr val="bg1">
+                  <a:lumMod val="50000"/>
+                </a:schemeClr>
+              </a:solidFill>
+              <a:latin typeface="Century Gothic" pitchFamily="34" charset="0"/>
+            </a:endParaRPr>
           </a:p>
           <a:p>
             <a:pPr algn="ctr">
@@ -3399,7 +3407,7 @@
   <p:timing>
     <p:tnLst>
       <p:par>
-        <p:cTn id="1" dur="indefinite" restart="never" nodeType="tmRoot"/>
+        <p:cTn xmlns:p14="http://schemas.microsoft.com/office/powerpoint/2010/main" id="1" dur="indefinite" restart="never" nodeType="tmRoot"/>
       </p:par>
     </p:tnLst>
   </p:timing>
@@ -3508,7 +3516,7 @@
   <p:timing>
     <p:tnLst>
       <p:par>
-        <p:cTn id="1" dur="indefinite" restart="never" nodeType="tmRoot"/>
+        <p:cTn xmlns:p14="http://schemas.microsoft.com/office/powerpoint/2010/main" id="1" dur="indefinite" restart="never" nodeType="tmRoot"/>
       </p:par>
     </p:tnLst>
   </p:timing>
@@ -3627,7 +3635,7 @@
   <p:timing>
     <p:tnLst>
       <p:par>
-        <p:cTn id="1" dur="indefinite" restart="never" nodeType="tmRoot"/>
+        <p:cTn xmlns:p14="http://schemas.microsoft.com/office/powerpoint/2010/main" id="1" dur="indefinite" restart="never" nodeType="tmRoot"/>
       </p:par>
     </p:tnLst>
   </p:timing>
@@ -3752,7 +3760,7 @@
   <p:timing>
     <p:tnLst>
       <p:par>
-        <p:cTn id="1" dur="indefinite" restart="never" nodeType="tmRoot"/>
+        <p:cTn xmlns:p14="http://schemas.microsoft.com/office/powerpoint/2010/main" id="1" dur="indefinite" restart="never" nodeType="tmRoot"/>
       </p:par>
     </p:tnLst>
   </p:timing>
@@ -3875,7 +3883,7 @@
   <p:timing>
     <p:tnLst>
       <p:par>
-        <p:cTn id="1" dur="indefinite" restart="never" nodeType="tmRoot"/>
+        <p:cTn xmlns:p14="http://schemas.microsoft.com/office/powerpoint/2010/main" id="1" dur="indefinite" restart="never" nodeType="tmRoot"/>
       </p:par>
     </p:tnLst>
   </p:timing>
@@ -4083,7 +4091,7 @@
   <p:timing>
     <p:tnLst>
       <p:par>
-        <p:cTn id="1" dur="indefinite" restart="never" nodeType="tmRoot"/>
+        <p:cTn xmlns:p14="http://schemas.microsoft.com/office/powerpoint/2010/main" id="1" dur="indefinite" restart="never" nodeType="tmRoot"/>
       </p:par>
     </p:tnLst>
   </p:timing>

</xml_diff>

<commit_message>
CHG: calabash added to presentation
</commit_message>
<xml_diff>
--- a/Presentation/abschlusspraesentation.pptx
+++ b/Presentation/abschlusspraesentation.pptx
@@ -4035,30 +4035,6 @@
       </p:grpSpPr>
       <p:sp>
         <p:nvSpPr>
-          <p:cNvPr id="4" name="Textplatzhalter 2"/>
-          <p:cNvSpPr>
-            <a:spLocks noGrp="1"/>
-          </p:cNvSpPr>
-          <p:nvPr>
-            <p:ph type="body" idx="1"/>
-          </p:nvPr>
-        </p:nvSpPr>
-        <p:spPr>
-          <a:xfrm>
-            <a:off x="539552" y="1700808"/>
-            <a:ext cx="7848872" cy="4464496"/>
-          </a:xfrm>
-        </p:spPr>
-        <p:txBody>
-          <a:bodyPr/>
-          <a:lstStyle/>
-          <a:p>
-            <a:endParaRPr lang="de-DE" dirty="0"/>
-          </a:p>
-        </p:txBody>
-      </p:sp>
-      <p:sp>
-        <p:nvSpPr>
           <p:cNvPr id="5" name="Titel 1"/>
           <p:cNvSpPr txBox="1">
             <a:spLocks/>
@@ -4068,7 +4044,7 @@
         <p:spPr>
           <a:xfrm>
             <a:off x="539552" y="260648"/>
-            <a:ext cx="6172200" cy="1008112"/>
+            <a:ext cx="7992888" cy="1008112"/>
           </a:xfrm>
           <a:prstGeom prst="rect">
             <a:avLst/>
@@ -4152,13 +4128,229 @@
           </a:lstStyle>
           <a:p>
             <a:r>
+              <a:rPr lang="de-DE" dirty="0" err="1" smtClean="0">
+                <a:latin typeface="Calibri" pitchFamily="34" charset="0"/>
+              </a:rPr>
+              <a:t>Function</a:t>
+            </a:r>
+            <a:r>
               <a:rPr lang="de-DE" dirty="0" smtClean="0">
                 <a:latin typeface="Calibri" pitchFamily="34" charset="0"/>
               </a:rPr>
-              <a:t>Muster</a:t>
+              <a:t> Tests</a:t>
             </a:r>
             <a:endParaRPr lang="de-DE" dirty="0">
               <a:latin typeface="Calibri" pitchFamily="34" charset="0"/>
+            </a:endParaRPr>
+          </a:p>
+        </p:txBody>
+      </p:sp>
+      <p:pic>
+        <p:nvPicPr>
+          <p:cNvPr id="1026" name="Picture 2"/>
+          <p:cNvPicPr>
+            <a:picLocks noChangeAspect="1" noChangeArrowheads="1"/>
+          </p:cNvPicPr>
+          <p:nvPr/>
+        </p:nvPicPr>
+        <p:blipFill rotWithShape="1">
+          <a:blip r:embed="rId3">
+            <a:extLst>
+              <a:ext uri="{28A0092B-C50C-407E-A947-70E740481C1C}">
+                <a14:useLocalDpi xmlns:a14="http://schemas.microsoft.com/office/drawing/2010/main" val="0"/>
+              </a:ext>
+            </a:extLst>
+          </a:blip>
+          <a:srcRect l="730" t="19643" r="36111" b="30358"/>
+          <a:stretch/>
+        </p:blipFill>
+        <p:spPr bwMode="auto">
+          <a:xfrm>
+            <a:off x="971600" y="2595442"/>
+            <a:ext cx="8092605" cy="3601911"/>
+          </a:xfrm>
+          <a:prstGeom prst="rect">
+            <a:avLst/>
+          </a:prstGeom>
+          <a:noFill/>
+          <a:ln>
+            <a:noFill/>
+          </a:ln>
+          <a:extLst>
+            <a:ext uri="{909E8E84-426E-40DD-AFC4-6F175D3DCCD1}">
+              <a14:hiddenFill xmlns:a14="http://schemas.microsoft.com/office/drawing/2010/main">
+                <a:solidFill>
+                  <a:schemeClr val="accent1"/>
+                </a:solidFill>
+              </a14:hiddenFill>
+            </a:ext>
+            <a:ext uri="{91240B29-F687-4F45-9708-019B960494DF}">
+              <a14:hiddenLine xmlns:a14="http://schemas.microsoft.com/office/drawing/2010/main" w="9525">
+                <a:solidFill>
+                  <a:schemeClr val="tx1"/>
+                </a:solidFill>
+                <a:miter lim="800000"/>
+                <a:headEnd/>
+                <a:tailEnd/>
+              </a14:hiddenLine>
+            </a:ext>
+          </a:extLst>
+        </p:spPr>
+      </p:pic>
+      <p:sp>
+        <p:nvSpPr>
+          <p:cNvPr id="2" name="Textfeld 1"/>
+          <p:cNvSpPr txBox="1"/>
+          <p:nvPr/>
+        </p:nvSpPr>
+        <p:spPr>
+          <a:xfrm>
+            <a:off x="1115616" y="1887215"/>
+            <a:ext cx="2573140" cy="461665"/>
+          </a:xfrm>
+          <a:prstGeom prst="rect">
+            <a:avLst/>
+          </a:prstGeom>
+          <a:noFill/>
+        </p:spPr>
+        <p:txBody>
+          <a:bodyPr wrap="none" rtlCol="0">
+            <a:spAutoFit/>
+          </a:bodyPr>
+          <a:lstStyle/>
+          <a:p>
+            <a:r>
+              <a:rPr lang="de-DE" sz="2400" b="1" dirty="0" err="1" smtClean="0">
+                <a:solidFill>
+                  <a:srgbClr val="00B0F0"/>
+                </a:solidFill>
+              </a:rPr>
+              <a:t>Calabash-Android</a:t>
+            </a:r>
+            <a:endParaRPr lang="de-DE" sz="2400" b="1" dirty="0">
+              <a:solidFill>
+                <a:srgbClr val="00B0F0"/>
+              </a:solidFill>
+            </a:endParaRPr>
+          </a:p>
+        </p:txBody>
+      </p:sp>
+      <p:pic>
+        <p:nvPicPr>
+          <p:cNvPr id="1028" name="Picture 4" descr="http://www.kcb-samen.ch/shop/images/225910.jpg"/>
+          <p:cNvPicPr>
+            <a:picLocks noChangeAspect="1" noChangeArrowheads="1"/>
+          </p:cNvPicPr>
+          <p:nvPr/>
+        </p:nvPicPr>
+        <p:blipFill>
+          <a:blip r:embed="rId4">
+            <a:extLst>
+              <a:ext uri="{28A0092B-C50C-407E-A947-70E740481C1C}">
+                <a14:useLocalDpi xmlns:a14="http://schemas.microsoft.com/office/drawing/2010/main" val="0"/>
+              </a:ext>
+            </a:extLst>
+          </a:blip>
+          <a:srcRect/>
+          <a:stretch>
+            <a:fillRect/>
+          </a:stretch>
+        </p:blipFill>
+        <p:spPr bwMode="auto">
+          <a:xfrm>
+            <a:off x="159583" y="1640738"/>
+            <a:ext cx="956033" cy="924166"/>
+          </a:xfrm>
+          <a:prstGeom prst="rect">
+            <a:avLst/>
+          </a:prstGeom>
+          <a:noFill/>
+          <a:extLst>
+            <a:ext uri="{909E8E84-426E-40DD-AFC4-6F175D3DCCD1}">
+              <a14:hiddenFill xmlns:a14="http://schemas.microsoft.com/office/drawing/2010/main">
+                <a:solidFill>
+                  <a:srgbClr val="FFFFFF"/>
+                </a:solidFill>
+              </a14:hiddenFill>
+            </a:ext>
+          </a:extLst>
+        </p:spPr>
+      </p:pic>
+      <p:pic>
+        <p:nvPicPr>
+          <p:cNvPr id="1030" name="Picture 6" descr="http://thumbs.dreamstime.com/thumblarge_560/1291060826iloOMF.jpg"/>
+          <p:cNvPicPr>
+            <a:picLocks noChangeAspect="1" noChangeArrowheads="1"/>
+          </p:cNvPicPr>
+          <p:nvPr/>
+        </p:nvPicPr>
+        <p:blipFill>
+          <a:blip r:embed="rId5" cstate="print">
+            <a:extLst>
+              <a:ext uri="{28A0092B-C50C-407E-A947-70E740481C1C}">
+                <a14:useLocalDpi xmlns:a14="http://schemas.microsoft.com/office/drawing/2010/main" val="0"/>
+              </a:ext>
+            </a:extLst>
+          </a:blip>
+          <a:srcRect/>
+          <a:stretch>
+            <a:fillRect/>
+          </a:stretch>
+        </p:blipFill>
+        <p:spPr bwMode="auto">
+          <a:xfrm>
+            <a:off x="4211960" y="1615622"/>
+            <a:ext cx="805942" cy="1115919"/>
+          </a:xfrm>
+          <a:prstGeom prst="rect">
+            <a:avLst/>
+          </a:prstGeom>
+          <a:noFill/>
+          <a:extLst>
+            <a:ext uri="{909E8E84-426E-40DD-AFC4-6F175D3DCCD1}">
+              <a14:hiddenFill xmlns:a14="http://schemas.microsoft.com/office/drawing/2010/main">
+                <a:solidFill>
+                  <a:srgbClr val="FFFFFF"/>
+                </a:solidFill>
+              </a14:hiddenFill>
+            </a:ext>
+          </a:extLst>
+        </p:spPr>
+      </p:pic>
+      <p:sp>
+        <p:nvSpPr>
+          <p:cNvPr id="8" name="Textfeld 7"/>
+          <p:cNvSpPr txBox="1"/>
+          <p:nvPr/>
+        </p:nvSpPr>
+        <p:spPr>
+          <a:xfrm>
+            <a:off x="5017902" y="1887214"/>
+            <a:ext cx="1225015" cy="461665"/>
+          </a:xfrm>
+          <a:prstGeom prst="rect">
+            <a:avLst/>
+          </a:prstGeom>
+          <a:noFill/>
+        </p:spPr>
+        <p:txBody>
+          <a:bodyPr wrap="none" rtlCol="0">
+            <a:spAutoFit/>
+          </a:bodyPr>
+          <a:lstStyle/>
+          <a:p>
+            <a:r>
+              <a:rPr lang="de-DE" sz="2400" b="1" dirty="0" err="1" smtClean="0">
+                <a:solidFill>
+                  <a:srgbClr val="00B0F0"/>
+                </a:solidFill>
+              </a:rPr>
+              <a:t>Gherkin</a:t>
+            </a:r>
+            <a:endParaRPr lang="de-DE" sz="2400" b="1" dirty="0">
+              <a:solidFill>
+                <a:srgbClr val="00B0F0"/>
+              </a:solidFill>
             </a:endParaRPr>
           </a:p>
         </p:txBody>

</xml_diff>

<commit_message>
CHG: Fehler in Activity Diagramm behoben
</commit_message>
<xml_diff>
--- a/Presentation/abschlusspraesentation.pptx
+++ b/Presentation/abschlusspraesentation.pptx
@@ -225,7 +225,6 @@
           </a:p>
         </c:rich>
       </c:tx>
-      <c:layout/>
       <c:overlay val="0"/>
     </c:title>
     <c:autoTitleDeleted val="0"/>
@@ -438,7 +437,6 @@
           </a:p>
         </c:rich>
       </c:tx>
-      <c:layout/>
       <c:overlay val="0"/>
     </c:title>
     <c:autoTitleDeleted val="0"/>
@@ -11357,7 +11355,7 @@
       </p:sp>
       <p:pic>
         <p:nvPicPr>
-          <p:cNvPr id="2" name="Grafik 1"/>
+          <p:cNvPr id="3" name="Grafik 2"/>
           <p:cNvPicPr>
             <a:picLocks noChangeAspect="1"/>
           </p:cNvPicPr>
@@ -11377,8 +11375,8 @@
         </p:blipFill>
         <p:spPr>
           <a:xfrm>
-            <a:off x="1322339" y="1628800"/>
-            <a:ext cx="6499323" cy="4851408"/>
+            <a:off x="1205626" y="1612015"/>
+            <a:ext cx="6732748" cy="5025647"/>
           </a:xfrm>
           <a:prstGeom prst="rect">
             <a:avLst/>

</xml_diff>